<commit_message>
subiendo mi tarea hito4
</commit_message>
<xml_diff>
--- a/HITO3/PROCESUAL/PROCESUAL HITO 3.pptx
+++ b/HITO3/PROCESUAL/PROCESUAL HITO 3.pptx
@@ -54,13 +54,15 @@
       <p:font typeface="Nunito Sans" pitchFamily="2" charset="0"/>
       <p:regular r:id="rId32"/>
       <p:bold r:id="rId33"/>
+      <p:italic r:id="rId34"/>
+      <p:boldItalic r:id="rId35"/>
     </p:embeddedFont>
     <p:embeddedFont>
       <p:font typeface="Roboto" panose="02000000000000000000" pitchFamily="2" charset="0"/>
-      <p:regular r:id="rId34"/>
-      <p:bold r:id="rId35"/>
-      <p:italic r:id="rId36"/>
-      <p:boldItalic r:id="rId37"/>
+      <p:regular r:id="rId36"/>
+      <p:bold r:id="rId37"/>
+      <p:italic r:id="rId38"/>
+      <p:boldItalic r:id="rId39"/>
     </p:embeddedFont>
   </p:embeddedFontLst>
   <p:defaultTextStyle>
@@ -23424,7 +23426,7 @@
         </p:blipFill>
         <p:spPr>
           <a:xfrm>
-            <a:off x="4272125" y="1115825"/>
+            <a:off x="4289058" y="1132758"/>
             <a:ext cx="4106417" cy="5381625"/>
           </a:xfrm>
           <a:prstGeom prst="rect">
@@ -26739,7 +26741,7 @@
         </p:blipFill>
         <p:spPr>
           <a:xfrm>
-            <a:off x="623887" y="2074984"/>
+            <a:off x="606954" y="2091917"/>
             <a:ext cx="7359529" cy="2446216"/>
           </a:xfrm>
           <a:prstGeom prst="rect">

</xml_diff>